<commit_message>
JPEG 2000 Assertion failure fix
Optical Flow Plugins

Support Zip of Raw Files

Introduced 'local' flag for Transform Rotate

Add Audio Plugins
</commit_message>
<xml_diff>
--- a/doc/JT Batch Manipulations.pptx
+++ b/doc/JT Batch Manipulations.pptx
@@ -215,7 +215,7 @@
           <a:p>
             <a:fld id="{686D4AF2-0393-BE4E-8F99-CF9FA3F73A75}" type="datetimeFigureOut">
               <a:rPr lang="en-US" smtClean="0"/>
-              <a:t>11/1/17</a:t>
+              <a:t>11/17/17</a:t>
             </a:fld>
             <a:endParaRPr lang="en-US"/>
           </a:p>
@@ -936,7 +936,7 @@
           <a:p>
             <a:fld id="{E7805177-88DF-B843-8423-9C72D489EB09}" type="datetimeFigureOut">
               <a:rPr lang="en-US" smtClean="0"/>
-              <a:t>11/1/17</a:t>
+              <a:t>11/17/17</a:t>
             </a:fld>
             <a:endParaRPr lang="en-US"/>
           </a:p>
@@ -1106,7 +1106,7 @@
           <a:p>
             <a:fld id="{E7805177-88DF-B843-8423-9C72D489EB09}" type="datetimeFigureOut">
               <a:rPr lang="en-US" smtClean="0"/>
-              <a:t>11/1/17</a:t>
+              <a:t>11/17/17</a:t>
             </a:fld>
             <a:endParaRPr lang="en-US"/>
           </a:p>
@@ -1286,7 +1286,7 @@
           <a:p>
             <a:fld id="{E7805177-88DF-B843-8423-9C72D489EB09}" type="datetimeFigureOut">
               <a:rPr lang="en-US" smtClean="0"/>
-              <a:t>11/1/17</a:t>
+              <a:t>11/17/17</a:t>
             </a:fld>
             <a:endParaRPr lang="en-US"/>
           </a:p>
@@ -1456,7 +1456,7 @@
           <a:p>
             <a:fld id="{E7805177-88DF-B843-8423-9C72D489EB09}" type="datetimeFigureOut">
               <a:rPr lang="en-US" smtClean="0"/>
-              <a:t>11/1/17</a:t>
+              <a:t>11/17/17</a:t>
             </a:fld>
             <a:endParaRPr lang="en-US"/>
           </a:p>
@@ -1702,7 +1702,7 @@
           <a:p>
             <a:fld id="{E7805177-88DF-B843-8423-9C72D489EB09}" type="datetimeFigureOut">
               <a:rPr lang="en-US" smtClean="0"/>
-              <a:t>11/1/17</a:t>
+              <a:t>11/17/17</a:t>
             </a:fld>
             <a:endParaRPr lang="en-US"/>
           </a:p>
@@ -1990,7 +1990,7 @@
           <a:p>
             <a:fld id="{E7805177-88DF-B843-8423-9C72D489EB09}" type="datetimeFigureOut">
               <a:rPr lang="en-US" smtClean="0"/>
-              <a:t>11/1/17</a:t>
+              <a:t>11/17/17</a:t>
             </a:fld>
             <a:endParaRPr lang="en-US"/>
           </a:p>
@@ -2412,7 +2412,7 @@
           <a:p>
             <a:fld id="{E7805177-88DF-B843-8423-9C72D489EB09}" type="datetimeFigureOut">
               <a:rPr lang="en-US" smtClean="0"/>
-              <a:t>11/1/17</a:t>
+              <a:t>11/17/17</a:t>
             </a:fld>
             <a:endParaRPr lang="en-US"/>
           </a:p>
@@ -2530,7 +2530,7 @@
           <a:p>
             <a:fld id="{E7805177-88DF-B843-8423-9C72D489EB09}" type="datetimeFigureOut">
               <a:rPr lang="en-US" smtClean="0"/>
-              <a:t>11/1/17</a:t>
+              <a:t>11/17/17</a:t>
             </a:fld>
             <a:endParaRPr lang="en-US"/>
           </a:p>
@@ -2625,7 +2625,7 @@
           <a:p>
             <a:fld id="{E7805177-88DF-B843-8423-9C72D489EB09}" type="datetimeFigureOut">
               <a:rPr lang="en-US" smtClean="0"/>
-              <a:t>11/1/17</a:t>
+              <a:t>11/17/17</a:t>
             </a:fld>
             <a:endParaRPr lang="en-US"/>
           </a:p>
@@ -2902,7 +2902,7 @@
           <a:p>
             <a:fld id="{E7805177-88DF-B843-8423-9C72D489EB09}" type="datetimeFigureOut">
               <a:rPr lang="en-US" smtClean="0"/>
-              <a:t>11/1/17</a:t>
+              <a:t>11/17/17</a:t>
             </a:fld>
             <a:endParaRPr lang="en-US"/>
           </a:p>
@@ -3155,7 +3155,7 @@
           <a:p>
             <a:fld id="{E7805177-88DF-B843-8423-9C72D489EB09}" type="datetimeFigureOut">
               <a:rPr lang="en-US" smtClean="0"/>
-              <a:t>11/1/17</a:t>
+              <a:t>11/17/17</a:t>
             </a:fld>
             <a:endParaRPr lang="en-US"/>
           </a:p>
@@ -3368,7 +3368,7 @@
           <a:p>
             <a:fld id="{E7805177-88DF-B843-8423-9C72D489EB09}" type="datetimeFigureOut">
               <a:rPr lang="en-US" smtClean="0"/>
-              <a:t>11/1/17</a:t>
+              <a:t>11/17/17</a:t>
             </a:fld>
             <a:endParaRPr lang="en-US"/>
           </a:p>
@@ -6485,7 +6485,7 @@
         <p:spPr>
           <a:xfrm>
             <a:off x="264462" y="1297163"/>
-            <a:ext cx="2237574" cy="5170646"/>
+            <a:ext cx="2237574" cy="5324535"/>
           </a:xfrm>
           <a:prstGeom prst="rect">
             <a:avLst/>
@@ -6716,16 +6716,50 @@
               <a:rPr lang="en-US" sz="1000" dirty="0" smtClean="0"/>
               <a:t>,</a:t>
             </a:r>
-            <a:br>
+          </a:p>
+          <a:p>
+            <a:r>
+              <a:rPr lang="en-US" sz="1000" dirty="0"/>
+              <a:t> </a:t>
+            </a:r>
+            <a:r>
               <a:rPr lang="en-US" sz="1000" dirty="0" smtClean="0"/>
-            </a:br>
+              <a:t>     </a:t>
+            </a:r>
+            <a:r>
+              <a:rPr lang="en-US" sz="1000" dirty="0"/>
+              <a:t> </a:t>
+            </a:r>
             <a:r>
               <a:rPr lang="en-US" sz="1000" dirty="0" smtClean="0"/>
-              <a:t>      </a:t>
+              <a:t>"</a:t>
+            </a:r>
+            <a:r>
+              <a:rPr lang="en-US" sz="1000" b="1" dirty="0" err="1" smtClean="0"/>
+              <a:t>filtypes</a:t>
             </a:r>
             <a:r>
               <a:rPr lang="en-US" sz="1000" b="1" dirty="0" smtClean="0"/>
               <a:t>"</a:t>
+            </a:r>
+            <a:r>
+              <a:rPr lang="en-US" sz="1000" dirty="0" smtClean="0"/>
+              <a:t>:       [</a:t>
+            </a:r>
+            <a:r>
+              <a:rPr lang="en-US" sz="1000" b="1" dirty="0" smtClean="0"/>
+              <a:t>”jpg”],</a:t>
+            </a:r>
+            <a:endParaRPr lang="en-US" sz="1000" dirty="0" smtClean="0"/>
+          </a:p>
+          <a:p>
+            <a:r>
+              <a:rPr lang="en-US" sz="1000" b="1" dirty="0"/>
+              <a:t> </a:t>
+            </a:r>
+            <a:r>
+              <a:rPr lang="en-US" sz="1000" b="1" dirty="0" smtClean="0"/>
+              <a:t>     "</a:t>
             </a:r>
             <a:r>
               <a:rPr lang="en-US" sz="1000" b="1" dirty="0" err="1" smtClean="0"/>
@@ -19008,15 +19042,7 @@
             </a:r>
             <a:r>
               <a:rPr lang="en-US" dirty="0" smtClean="0"/>
-              <a:t>performs </a:t>
-            </a:r>
-            <a:r>
-              <a:rPr lang="en-US" dirty="0" smtClean="0"/>
-              <a:t>manipulations </a:t>
-            </a:r>
-            <a:r>
-              <a:rPr lang="en-US" dirty="0" smtClean="0"/>
-              <a:t>with plugins.</a:t>
+              <a:t>performs manipulations with plugins.</a:t>
             </a:r>
           </a:p>
           <a:p>
@@ -20053,11 +20079,7 @@
             </a:r>
             <a:r>
               <a:rPr lang="en-US" sz="1400" dirty="0" smtClean="0"/>
-              <a:t> Execute a plugin on a image to produce an (input) mask and any additional name/value pairs to be used to as parameters in subsequent operations.  Input masks highlight groups of pixels (full intensity) as constraints to other plugins</a:t>
-            </a:r>
-            <a:r>
-              <a:rPr lang="en-US" sz="1400" dirty="0" smtClean="0"/>
-              <a:t>.</a:t>
+              <a:t> Execute a plugin on a image to produce an (input) mask and any additional name/value pairs to be used to as parameters in subsequent operations.  Input masks highlight groups of pixels (full intensity) as constraints to other plugins.</a:t>
             </a:r>
           </a:p>
           <a:p>
@@ -20106,7 +20128,6 @@
               <a:rPr lang="en-US" sz="1400" b="1" dirty="0" smtClean="0"/>
               <a:t>  </a:t>
             </a:r>
-            <a:endParaRPr lang="en-US" sz="1400" b="1" dirty="0" smtClean="0"/>
           </a:p>
         </p:txBody>
       </p:sp>
@@ -21558,8 +21579,40 @@
             </a:r>
             <a:r>
               <a:rPr lang="en-US" sz="1600" dirty="0" smtClean="0"/>
-              <a:t>= a directory of a pool of images to select from (randomly)</a:t>
-            </a:r>
+              <a:t>= a directory of a pool </a:t>
+            </a:r>
+            <a:r>
+              <a:rPr lang="en-US" sz="1600" dirty="0" smtClean="0"/>
+              <a:t>of ONLY  </a:t>
+            </a:r>
+            <a:r>
+              <a:rPr lang="en-US" sz="1600" dirty="0" smtClean="0"/>
+              <a:t>images to select from (randomly</a:t>
+            </a:r>
+            <a:r>
+              <a:rPr lang="en-US" sz="1600" dirty="0" smtClean="0"/>
+              <a:t>)</a:t>
+            </a:r>
+          </a:p>
+          <a:p>
+            <a:pPr lvl="2"/>
+            <a:r>
+              <a:rPr lang="en-US" sz="1600" dirty="0" smtClean="0"/>
+              <a:t>“</a:t>
+            </a:r>
+            <a:r>
+              <a:rPr lang="en-US" sz="1600" dirty="0" err="1" smtClean="0"/>
+              <a:t>filetypes</a:t>
+            </a:r>
+            <a:r>
+              <a:rPr lang="en-US" sz="1600" dirty="0" smtClean="0"/>
+              <a:t>” = a list of files types to select from the image directory.  </a:t>
+            </a:r>
+            <a:r>
+              <a:rPr lang="en-US" sz="1600" dirty="0" smtClean="0"/>
+              <a:t>This is optional.</a:t>
+            </a:r>
+            <a:endParaRPr lang="en-US" sz="1600" dirty="0" smtClean="0"/>
           </a:p>
           <a:p>
             <a:pPr lvl="2"/>
@@ -22020,7 +22073,6 @@
               <a:rPr lang="en-US" sz="2100" b="1" dirty="0" smtClean="0"/>
               <a:t>Represent a ‘base’ node for existing project</a:t>
             </a:r>
-            <a:endParaRPr lang="en-US" sz="2100" b="1" dirty="0" smtClean="0"/>
           </a:p>
           <a:p>
             <a:pPr lvl="2"/>
@@ -22045,21 +22097,12 @@
               <a:rPr lang="en-US" sz="2100" b="1" dirty="0" smtClean="0"/>
               <a:t>Consume results from an external operation.</a:t>
             </a:r>
-            <a:endParaRPr lang="en-US" sz="2100" b="1" dirty="0" smtClean="0"/>
           </a:p>
           <a:p>
             <a:pPr lvl="2"/>
             <a:r>
               <a:rPr lang="en-US" sz="2100" dirty="0" smtClean="0"/>
-              <a:t>Plugin is external. The result image is </a:t>
-            </a:r>
-            <a:r>
-              <a:rPr lang="en-US" sz="2100" dirty="0" smtClean="0"/>
-              <a:t>located based the name of the source.</a:t>
-            </a:r>
-            <a:r>
-              <a:rPr lang="en-US" sz="2100" dirty="0" smtClean="0"/>
-              <a:t>  </a:t>
+              <a:t>Plugin is external. The result image is located based the name of the source.  </a:t>
             </a:r>
             <a:endParaRPr lang="en-US" sz="2100" b="1" dirty="0"/>
           </a:p>

</xml_diff>